<commit_message>
Revise the dates related to wl
related to the waitlisting within 2 years of dialysis start
</commit_message>
<xml_diff>
--- a/Dashboard Calculations Figures_11.27.25.pptx
+++ b/Dashboard Calculations Figures_11.27.25.pptx
@@ -259,7 +259,7 @@
           <a:p>
             <a:fld id="{280A6B28-1781-4B76-951E-A11F367A329E}" type="datetimeFigureOut">
               <a:rPr lang="en-US" smtClean="0"/>
-              <a:t>12/1/25</a:t>
+              <a:t>12/1/2025</a:t>
             </a:fld>
             <a:endParaRPr lang="en-US"/>
           </a:p>
@@ -457,7 +457,7 @@
           <a:p>
             <a:fld id="{280A6B28-1781-4B76-951E-A11F367A329E}" type="datetimeFigureOut">
               <a:rPr lang="en-US" smtClean="0"/>
-              <a:t>12/1/25</a:t>
+              <a:t>12/1/2025</a:t>
             </a:fld>
             <a:endParaRPr lang="en-US"/>
           </a:p>
@@ -665,7 +665,7 @@
           <a:p>
             <a:fld id="{280A6B28-1781-4B76-951E-A11F367A329E}" type="datetimeFigureOut">
               <a:rPr lang="en-US" smtClean="0"/>
-              <a:t>12/1/25</a:t>
+              <a:t>12/1/2025</a:t>
             </a:fld>
             <a:endParaRPr lang="en-US"/>
           </a:p>
@@ -863,7 +863,7 @@
           <a:p>
             <a:fld id="{280A6B28-1781-4B76-951E-A11F367A329E}" type="datetimeFigureOut">
               <a:rPr lang="en-US" smtClean="0"/>
-              <a:t>12/1/25</a:t>
+              <a:t>12/1/2025</a:t>
             </a:fld>
             <a:endParaRPr lang="en-US"/>
           </a:p>
@@ -1138,7 +1138,7 @@
           <a:p>
             <a:fld id="{280A6B28-1781-4B76-951E-A11F367A329E}" type="datetimeFigureOut">
               <a:rPr lang="en-US" smtClean="0"/>
-              <a:t>12/1/25</a:t>
+              <a:t>12/1/2025</a:t>
             </a:fld>
             <a:endParaRPr lang="en-US"/>
           </a:p>
@@ -1403,7 +1403,7 @@
           <a:p>
             <a:fld id="{280A6B28-1781-4B76-951E-A11F367A329E}" type="datetimeFigureOut">
               <a:rPr lang="en-US" smtClean="0"/>
-              <a:t>12/1/25</a:t>
+              <a:t>12/1/2025</a:t>
             </a:fld>
             <a:endParaRPr lang="en-US"/>
           </a:p>
@@ -1815,7 +1815,7 @@
           <a:p>
             <a:fld id="{280A6B28-1781-4B76-951E-A11F367A329E}" type="datetimeFigureOut">
               <a:rPr lang="en-US" smtClean="0"/>
-              <a:t>12/1/25</a:t>
+              <a:t>12/1/2025</a:t>
             </a:fld>
             <a:endParaRPr lang="en-US"/>
           </a:p>
@@ -1956,7 +1956,7 @@
           <a:p>
             <a:fld id="{280A6B28-1781-4B76-951E-A11F367A329E}" type="datetimeFigureOut">
               <a:rPr lang="en-US" smtClean="0"/>
-              <a:t>12/1/25</a:t>
+              <a:t>12/1/2025</a:t>
             </a:fld>
             <a:endParaRPr lang="en-US"/>
           </a:p>
@@ -2069,7 +2069,7 @@
           <a:p>
             <a:fld id="{280A6B28-1781-4B76-951E-A11F367A329E}" type="datetimeFigureOut">
               <a:rPr lang="en-US" smtClean="0"/>
-              <a:t>12/1/25</a:t>
+              <a:t>12/1/2025</a:t>
             </a:fld>
             <a:endParaRPr lang="en-US"/>
           </a:p>
@@ -2380,7 +2380,7 @@
           <a:p>
             <a:fld id="{280A6B28-1781-4B76-951E-A11F367A329E}" type="datetimeFigureOut">
               <a:rPr lang="en-US" smtClean="0"/>
-              <a:t>12/1/25</a:t>
+              <a:t>12/1/2025</a:t>
             </a:fld>
             <a:endParaRPr lang="en-US"/>
           </a:p>
@@ -2668,7 +2668,7 @@
           <a:p>
             <a:fld id="{280A6B28-1781-4B76-951E-A11F367A329E}" type="datetimeFigureOut">
               <a:rPr lang="en-US" smtClean="0"/>
-              <a:t>12/1/25</a:t>
+              <a:t>12/1/2025</a:t>
             </a:fld>
             <a:endParaRPr lang="en-US"/>
           </a:p>
@@ -2909,7 +2909,7 @@
           <a:p>
             <a:fld id="{280A6B28-1781-4B76-951E-A11F367A329E}" type="datetimeFigureOut">
               <a:rPr lang="en-US" smtClean="0"/>
-              <a:t>12/1/25</a:t>
+              <a:t>12/1/2025</a:t>
             </a:fld>
             <a:endParaRPr lang="en-US"/>
           </a:p>
@@ -4968,7 +4968,7 @@
                     </a:schemeClr>
                   </a:solidFill>
                 </a:rPr>
-                <a:t>(Waitlisting through 3/15/2024, last dialysis start 12/31/2023)</a:t>
+                <a:t>(Waitlisting through 3/15/2024, last dialysis start 3/15/2022)</a:t>
               </a:r>
             </a:p>
           </p:txBody>

</xml_diff>